<commit_message>
update sys ctx figure
</commit_message>
<xml_diff>
--- a/docs/SRS/SystemContextFigure.pptx
+++ b/docs/SRS/SystemContextFigure.pptx
@@ -7,7 +7,7 @@
   <p:sldIdLst>
     <p:sldId id="256" r:id="rId2"/>
   </p:sldIdLst>
-  <p:sldSz cx="9144000" cy="6858000" type="screen4x3"/>
+  <p:sldSz cx="9144000" cy="3600450"/>
   <p:notesSz cx="6858000" cy="9144000"/>
   <p:defaultTextStyle>
     <a:defPPr>
@@ -107,12 +107,12 @@
   <p:extLst>
     <p:ext uri="{EFAFB233-063F-42B5-8137-9DF3F51BA10A}">
       <p15:sldGuideLst xmlns:p15="http://schemas.microsoft.com/office/powerpoint/2012/main">
-        <p15:guide id="1" orient="horz" pos="2160">
+        <p15:guide id="1" orient="horz" pos="1134" userDrawn="1">
           <p15:clr>
             <a:srgbClr val="A4A3A4"/>
           </p15:clr>
         </p15:guide>
-        <p15:guide id="2" pos="2880">
+        <p15:guide id="2" pos="2880" userDrawn="1">
           <p15:clr>
             <a:srgbClr val="A4A3A4"/>
           </p15:clr>
@@ -152,8 +152,8 @@
         </p:nvSpPr>
         <p:spPr>
           <a:xfrm>
-            <a:off x="685800" y="2130425"/>
-            <a:ext cx="7772400" cy="1470025"/>
+            <a:off x="685800" y="1118473"/>
+            <a:ext cx="7772400" cy="771763"/>
           </a:xfrm>
         </p:spPr>
         <p:txBody>
@@ -180,8 +180,8 @@
         </p:nvSpPr>
         <p:spPr>
           <a:xfrm>
-            <a:off x="1371600" y="3886200"/>
-            <a:ext cx="6400800" cy="1752600"/>
+            <a:off x="1371600" y="2040255"/>
+            <a:ext cx="6400800" cy="920115"/>
           </a:xfrm>
         </p:spPr>
         <p:txBody>
@@ -197,7 +197,7 @@
                 </a:solidFill>
               </a:defRPr>
             </a:lvl1pPr>
-            <a:lvl2pPr marL="457200" indent="0" algn="ctr">
+            <a:lvl2pPr marL="457219" indent="0" algn="ctr">
               <a:buNone/>
               <a:defRPr>
                 <a:solidFill>
@@ -207,7 +207,7 @@
                 </a:solidFill>
               </a:defRPr>
             </a:lvl2pPr>
-            <a:lvl3pPr marL="914400" indent="0" algn="ctr">
+            <a:lvl3pPr marL="914437" indent="0" algn="ctr">
               <a:buNone/>
               <a:defRPr>
                 <a:solidFill>
@@ -217,7 +217,7 @@
                 </a:solidFill>
               </a:defRPr>
             </a:lvl3pPr>
-            <a:lvl4pPr marL="1371600" indent="0" algn="ctr">
+            <a:lvl4pPr marL="1371656" indent="0" algn="ctr">
               <a:buNone/>
               <a:defRPr>
                 <a:solidFill>
@@ -227,7 +227,7 @@
                 </a:solidFill>
               </a:defRPr>
             </a:lvl4pPr>
-            <a:lvl5pPr marL="1828800" indent="0" algn="ctr">
+            <a:lvl5pPr marL="1828875" indent="0" algn="ctr">
               <a:buNone/>
               <a:defRPr>
                 <a:solidFill>
@@ -237,7 +237,7 @@
                 </a:solidFill>
               </a:defRPr>
             </a:lvl5pPr>
-            <a:lvl6pPr marL="2286000" indent="0" algn="ctr">
+            <a:lvl6pPr marL="2286094" indent="0" algn="ctr">
               <a:buNone/>
               <a:defRPr>
                 <a:solidFill>
@@ -247,7 +247,7 @@
                 </a:solidFill>
               </a:defRPr>
             </a:lvl6pPr>
-            <a:lvl7pPr marL="2743200" indent="0" algn="ctr">
+            <a:lvl7pPr marL="2743312" indent="0" algn="ctr">
               <a:buNone/>
               <a:defRPr>
                 <a:solidFill>
@@ -257,7 +257,7 @@
                 </a:solidFill>
               </a:defRPr>
             </a:lvl7pPr>
-            <a:lvl8pPr marL="3200400" indent="0" algn="ctr">
+            <a:lvl8pPr marL="3200531" indent="0" algn="ctr">
               <a:buNone/>
               <a:defRPr>
                 <a:solidFill>
@@ -267,7 +267,7 @@
                 </a:solidFill>
               </a:defRPr>
             </a:lvl8pPr>
-            <a:lvl9pPr marL="3657600" indent="0" algn="ctr">
+            <a:lvl9pPr marL="3657750" indent="0" algn="ctr">
               <a:buNone/>
               <a:defRPr>
                 <a:solidFill>
@@ -304,7 +304,7 @@
           <a:p>
             <a:fld id="{779256A2-DE0C-7447-B687-786F38514E8C}" type="datetimeFigureOut">
               <a:rPr lang="en-US" smtClean="0"/>
-              <a:t>9/4/19</a:t>
+              <a:t>2/1/2023</a:t>
             </a:fld>
             <a:endParaRPr lang="en-US"/>
           </a:p>
@@ -474,7 +474,7 @@
           <a:p>
             <a:fld id="{779256A2-DE0C-7447-B687-786F38514E8C}" type="datetimeFigureOut">
               <a:rPr lang="en-US" smtClean="0"/>
-              <a:t>9/4/19</a:t>
+              <a:t>2/1/2023</a:t>
             </a:fld>
             <a:endParaRPr lang="en-US"/>
           </a:p>
@@ -564,8 +564,8 @@
         </p:nvSpPr>
         <p:spPr>
           <a:xfrm>
-            <a:off x="6629400" y="274638"/>
-            <a:ext cx="2057400" cy="5851525"/>
+            <a:off x="6629400" y="144186"/>
+            <a:ext cx="2057400" cy="3072050"/>
           </a:xfrm>
         </p:spPr>
         <p:txBody>
@@ -592,8 +592,8 @@
         </p:nvSpPr>
         <p:spPr>
           <a:xfrm>
-            <a:off x="457200" y="274638"/>
-            <a:ext cx="6019800" cy="5851525"/>
+            <a:off x="457200" y="144186"/>
+            <a:ext cx="6019800" cy="3072050"/>
           </a:xfrm>
         </p:spPr>
         <p:txBody>
@@ -654,7 +654,7 @@
           <a:p>
             <a:fld id="{779256A2-DE0C-7447-B687-786F38514E8C}" type="datetimeFigureOut">
               <a:rPr lang="en-US" smtClean="0"/>
-              <a:t>9/4/19</a:t>
+              <a:t>2/1/2023</a:t>
             </a:fld>
             <a:endParaRPr lang="en-US"/>
           </a:p>
@@ -824,7 +824,7 @@
           <a:p>
             <a:fld id="{779256A2-DE0C-7447-B687-786F38514E8C}" type="datetimeFigureOut">
               <a:rPr lang="en-US" smtClean="0"/>
-              <a:t>9/4/19</a:t>
+              <a:t>2/1/2023</a:t>
             </a:fld>
             <a:endParaRPr lang="en-US"/>
           </a:p>
@@ -914,8 +914,8 @@
         </p:nvSpPr>
         <p:spPr>
           <a:xfrm>
-            <a:off x="722313" y="4406900"/>
-            <a:ext cx="7772400" cy="1362075"/>
+            <a:off x="722313" y="2313622"/>
+            <a:ext cx="7772400" cy="715089"/>
           </a:xfrm>
         </p:spPr>
         <p:txBody>
@@ -946,8 +946,8 @@
         </p:nvSpPr>
         <p:spPr>
           <a:xfrm>
-            <a:off x="722313" y="2906713"/>
-            <a:ext cx="7772400" cy="1500187"/>
+            <a:off x="722313" y="1526025"/>
+            <a:ext cx="7772400" cy="787598"/>
           </a:xfrm>
         </p:spPr>
         <p:txBody>
@@ -963,7 +963,7 @@
                 </a:solidFill>
               </a:defRPr>
             </a:lvl1pPr>
-            <a:lvl2pPr marL="457200" indent="0">
+            <a:lvl2pPr marL="457219" indent="0">
               <a:buNone/>
               <a:defRPr sz="1800">
                 <a:solidFill>
@@ -973,7 +973,7 @@
                 </a:solidFill>
               </a:defRPr>
             </a:lvl2pPr>
-            <a:lvl3pPr marL="914400" indent="0">
+            <a:lvl3pPr marL="914437" indent="0">
               <a:buNone/>
               <a:defRPr sz="1600">
                 <a:solidFill>
@@ -983,7 +983,7 @@
                 </a:solidFill>
               </a:defRPr>
             </a:lvl3pPr>
-            <a:lvl4pPr marL="1371600" indent="0">
+            <a:lvl4pPr marL="1371656" indent="0">
               <a:buNone/>
               <a:defRPr sz="1400">
                 <a:solidFill>
@@ -993,7 +993,7 @@
                 </a:solidFill>
               </a:defRPr>
             </a:lvl4pPr>
-            <a:lvl5pPr marL="1828800" indent="0">
+            <a:lvl5pPr marL="1828875" indent="0">
               <a:buNone/>
               <a:defRPr sz="1400">
                 <a:solidFill>
@@ -1003,7 +1003,7 @@
                 </a:solidFill>
               </a:defRPr>
             </a:lvl5pPr>
-            <a:lvl6pPr marL="2286000" indent="0">
+            <a:lvl6pPr marL="2286094" indent="0">
               <a:buNone/>
               <a:defRPr sz="1400">
                 <a:solidFill>
@@ -1013,7 +1013,7 @@
                 </a:solidFill>
               </a:defRPr>
             </a:lvl6pPr>
-            <a:lvl7pPr marL="2743200" indent="0">
+            <a:lvl7pPr marL="2743312" indent="0">
               <a:buNone/>
               <a:defRPr sz="1400">
                 <a:solidFill>
@@ -1023,7 +1023,7 @@
                 </a:solidFill>
               </a:defRPr>
             </a:lvl7pPr>
-            <a:lvl8pPr marL="3200400" indent="0">
+            <a:lvl8pPr marL="3200531" indent="0">
               <a:buNone/>
               <a:defRPr sz="1400">
                 <a:solidFill>
@@ -1033,7 +1033,7 @@
                 </a:solidFill>
               </a:defRPr>
             </a:lvl8pPr>
-            <a:lvl9pPr marL="3657600" indent="0">
+            <a:lvl9pPr marL="3657750" indent="0">
               <a:buNone/>
               <a:defRPr sz="1400">
                 <a:solidFill>
@@ -1070,7 +1070,7 @@
           <a:p>
             <a:fld id="{779256A2-DE0C-7447-B687-786F38514E8C}" type="datetimeFigureOut">
               <a:rPr lang="en-US" smtClean="0"/>
-              <a:t>9/4/19</a:t>
+              <a:t>2/1/2023</a:t>
             </a:fld>
             <a:endParaRPr lang="en-US"/>
           </a:p>
@@ -1183,8 +1183,8 @@
         </p:nvSpPr>
         <p:spPr>
           <a:xfrm>
-            <a:off x="457200" y="1600200"/>
-            <a:ext cx="4038600" cy="4525963"/>
+            <a:off x="457200" y="840106"/>
+            <a:ext cx="4038600" cy="2376131"/>
           </a:xfrm>
         </p:spPr>
         <p:txBody>
@@ -1268,8 +1268,8 @@
         </p:nvSpPr>
         <p:spPr>
           <a:xfrm>
-            <a:off x="4648200" y="1600200"/>
-            <a:ext cx="4038600" cy="4525963"/>
+            <a:off x="4648200" y="840106"/>
+            <a:ext cx="4038600" cy="2376131"/>
           </a:xfrm>
         </p:spPr>
         <p:txBody>
@@ -1358,7 +1358,7 @@
           <a:p>
             <a:fld id="{779256A2-DE0C-7447-B687-786F38514E8C}" type="datetimeFigureOut">
               <a:rPr lang="en-US" smtClean="0"/>
-              <a:t>9/4/19</a:t>
+              <a:t>2/1/2023</a:t>
             </a:fld>
             <a:endParaRPr lang="en-US"/>
           </a:p>
@@ -1475,8 +1475,8 @@
         </p:nvSpPr>
         <p:spPr>
           <a:xfrm>
-            <a:off x="457200" y="1535113"/>
-            <a:ext cx="4040188" cy="639762"/>
+            <a:off x="457200" y="805935"/>
+            <a:ext cx="4040188" cy="335875"/>
           </a:xfrm>
         </p:spPr>
         <p:txBody>
@@ -1486,35 +1486,35 @@
               <a:buNone/>
               <a:defRPr sz="2400" b="1"/>
             </a:lvl1pPr>
-            <a:lvl2pPr marL="457200" indent="0">
+            <a:lvl2pPr marL="457219" indent="0">
               <a:buNone/>
               <a:defRPr sz="2000" b="1"/>
             </a:lvl2pPr>
-            <a:lvl3pPr marL="914400" indent="0">
+            <a:lvl3pPr marL="914437" indent="0">
               <a:buNone/>
               <a:defRPr sz="1800" b="1"/>
             </a:lvl3pPr>
-            <a:lvl4pPr marL="1371600" indent="0">
+            <a:lvl4pPr marL="1371656" indent="0">
               <a:buNone/>
               <a:defRPr sz="1600" b="1"/>
             </a:lvl4pPr>
-            <a:lvl5pPr marL="1828800" indent="0">
+            <a:lvl5pPr marL="1828875" indent="0">
               <a:buNone/>
               <a:defRPr sz="1600" b="1"/>
             </a:lvl5pPr>
-            <a:lvl6pPr marL="2286000" indent="0">
+            <a:lvl6pPr marL="2286094" indent="0">
               <a:buNone/>
               <a:defRPr sz="1600" b="1"/>
             </a:lvl6pPr>
-            <a:lvl7pPr marL="2743200" indent="0">
+            <a:lvl7pPr marL="2743312" indent="0">
               <a:buNone/>
               <a:defRPr sz="1600" b="1"/>
             </a:lvl7pPr>
-            <a:lvl8pPr marL="3200400" indent="0">
+            <a:lvl8pPr marL="3200531" indent="0">
               <a:buNone/>
               <a:defRPr sz="1600" b="1"/>
             </a:lvl8pPr>
-            <a:lvl9pPr marL="3657600" indent="0">
+            <a:lvl9pPr marL="3657750" indent="0">
               <a:buNone/>
               <a:defRPr sz="1600" b="1"/>
             </a:lvl9pPr>
@@ -1540,8 +1540,8 @@
         </p:nvSpPr>
         <p:spPr>
           <a:xfrm>
-            <a:off x="457200" y="2174875"/>
-            <a:ext cx="4040188" cy="3951288"/>
+            <a:off x="457200" y="1141810"/>
+            <a:ext cx="4040188" cy="2074426"/>
           </a:xfrm>
         </p:spPr>
         <p:txBody>
@@ -1625,8 +1625,8 @@
         </p:nvSpPr>
         <p:spPr>
           <a:xfrm>
-            <a:off x="4645025" y="1535113"/>
-            <a:ext cx="4041775" cy="639762"/>
+            <a:off x="4645030" y="805935"/>
+            <a:ext cx="4041775" cy="335875"/>
           </a:xfrm>
         </p:spPr>
         <p:txBody>
@@ -1636,35 +1636,35 @@
               <a:buNone/>
               <a:defRPr sz="2400" b="1"/>
             </a:lvl1pPr>
-            <a:lvl2pPr marL="457200" indent="0">
+            <a:lvl2pPr marL="457219" indent="0">
               <a:buNone/>
               <a:defRPr sz="2000" b="1"/>
             </a:lvl2pPr>
-            <a:lvl3pPr marL="914400" indent="0">
+            <a:lvl3pPr marL="914437" indent="0">
               <a:buNone/>
               <a:defRPr sz="1800" b="1"/>
             </a:lvl3pPr>
-            <a:lvl4pPr marL="1371600" indent="0">
+            <a:lvl4pPr marL="1371656" indent="0">
               <a:buNone/>
               <a:defRPr sz="1600" b="1"/>
             </a:lvl4pPr>
-            <a:lvl5pPr marL="1828800" indent="0">
+            <a:lvl5pPr marL="1828875" indent="0">
               <a:buNone/>
               <a:defRPr sz="1600" b="1"/>
             </a:lvl5pPr>
-            <a:lvl6pPr marL="2286000" indent="0">
+            <a:lvl6pPr marL="2286094" indent="0">
               <a:buNone/>
               <a:defRPr sz="1600" b="1"/>
             </a:lvl6pPr>
-            <a:lvl7pPr marL="2743200" indent="0">
+            <a:lvl7pPr marL="2743312" indent="0">
               <a:buNone/>
               <a:defRPr sz="1600" b="1"/>
             </a:lvl7pPr>
-            <a:lvl8pPr marL="3200400" indent="0">
+            <a:lvl8pPr marL="3200531" indent="0">
               <a:buNone/>
               <a:defRPr sz="1600" b="1"/>
             </a:lvl8pPr>
-            <a:lvl9pPr marL="3657600" indent="0">
+            <a:lvl9pPr marL="3657750" indent="0">
               <a:buNone/>
               <a:defRPr sz="1600" b="1"/>
             </a:lvl9pPr>
@@ -1690,8 +1690,8 @@
         </p:nvSpPr>
         <p:spPr>
           <a:xfrm>
-            <a:off x="4645025" y="2174875"/>
-            <a:ext cx="4041775" cy="3951288"/>
+            <a:off x="4645030" y="1141810"/>
+            <a:ext cx="4041775" cy="2074426"/>
           </a:xfrm>
         </p:spPr>
         <p:txBody>
@@ -1780,7 +1780,7 @@
           <a:p>
             <a:fld id="{779256A2-DE0C-7447-B687-786F38514E8C}" type="datetimeFigureOut">
               <a:rPr lang="en-US" smtClean="0"/>
-              <a:t>9/4/19</a:t>
+              <a:t>2/1/2023</a:t>
             </a:fld>
             <a:endParaRPr lang="en-US"/>
           </a:p>
@@ -1898,7 +1898,7 @@
           <a:p>
             <a:fld id="{779256A2-DE0C-7447-B687-786F38514E8C}" type="datetimeFigureOut">
               <a:rPr lang="en-US" smtClean="0"/>
-              <a:t>9/4/19</a:t>
+              <a:t>2/1/2023</a:t>
             </a:fld>
             <a:endParaRPr lang="en-US"/>
           </a:p>
@@ -1993,7 +1993,7 @@
           <a:p>
             <a:fld id="{779256A2-DE0C-7447-B687-786F38514E8C}" type="datetimeFigureOut">
               <a:rPr lang="en-US" smtClean="0"/>
-              <a:t>9/4/19</a:t>
+              <a:t>2/1/2023</a:t>
             </a:fld>
             <a:endParaRPr lang="en-US"/>
           </a:p>
@@ -2083,8 +2083,8 @@
         </p:nvSpPr>
         <p:spPr>
           <a:xfrm>
-            <a:off x="457200" y="273050"/>
-            <a:ext cx="3008313" cy="1162050"/>
+            <a:off x="457205" y="143352"/>
+            <a:ext cx="3008313" cy="610076"/>
           </a:xfrm>
         </p:spPr>
         <p:txBody>
@@ -2115,8 +2115,8 @@
         </p:nvSpPr>
         <p:spPr>
           <a:xfrm>
-            <a:off x="3575050" y="273050"/>
-            <a:ext cx="5111750" cy="5853113"/>
+            <a:off x="3575050" y="143352"/>
+            <a:ext cx="5111750" cy="3072885"/>
           </a:xfrm>
         </p:spPr>
         <p:txBody>
@@ -2200,8 +2200,8 @@
         </p:nvSpPr>
         <p:spPr>
           <a:xfrm>
-            <a:off x="457200" y="1435100"/>
-            <a:ext cx="3008313" cy="4691063"/>
+            <a:off x="457205" y="753428"/>
+            <a:ext cx="3008313" cy="2462808"/>
           </a:xfrm>
         </p:spPr>
         <p:txBody>
@@ -2211,37 +2211,37 @@
               <a:buNone/>
               <a:defRPr sz="1400"/>
             </a:lvl1pPr>
-            <a:lvl2pPr marL="457200" indent="0">
+            <a:lvl2pPr marL="457219" indent="0">
               <a:buNone/>
               <a:defRPr sz="1200"/>
             </a:lvl2pPr>
-            <a:lvl3pPr marL="914400" indent="0">
+            <a:lvl3pPr marL="914437" indent="0">
               <a:buNone/>
               <a:defRPr sz="1000"/>
             </a:lvl3pPr>
-            <a:lvl4pPr marL="1371600" indent="0">
-              <a:buNone/>
-              <a:defRPr sz="900"/>
+            <a:lvl4pPr marL="1371656" indent="0">
+              <a:buNone/>
+              <a:defRPr sz="901"/>
             </a:lvl4pPr>
-            <a:lvl5pPr marL="1828800" indent="0">
-              <a:buNone/>
-              <a:defRPr sz="900"/>
+            <a:lvl5pPr marL="1828875" indent="0">
+              <a:buNone/>
+              <a:defRPr sz="901"/>
             </a:lvl5pPr>
-            <a:lvl6pPr marL="2286000" indent="0">
-              <a:buNone/>
-              <a:defRPr sz="900"/>
+            <a:lvl6pPr marL="2286094" indent="0">
+              <a:buNone/>
+              <a:defRPr sz="901"/>
             </a:lvl6pPr>
-            <a:lvl7pPr marL="2743200" indent="0">
-              <a:buNone/>
-              <a:defRPr sz="900"/>
+            <a:lvl7pPr marL="2743312" indent="0">
+              <a:buNone/>
+              <a:defRPr sz="901"/>
             </a:lvl7pPr>
-            <a:lvl8pPr marL="3200400" indent="0">
-              <a:buNone/>
-              <a:defRPr sz="900"/>
+            <a:lvl8pPr marL="3200531" indent="0">
+              <a:buNone/>
+              <a:defRPr sz="901"/>
             </a:lvl8pPr>
-            <a:lvl9pPr marL="3657600" indent="0">
-              <a:buNone/>
-              <a:defRPr sz="900"/>
+            <a:lvl9pPr marL="3657750" indent="0">
+              <a:buNone/>
+              <a:defRPr sz="901"/>
             </a:lvl9pPr>
           </a:lstStyle>
           <a:p>
@@ -2270,7 +2270,7 @@
           <a:p>
             <a:fld id="{779256A2-DE0C-7447-B687-786F38514E8C}" type="datetimeFigureOut">
               <a:rPr lang="en-US" smtClean="0"/>
-              <a:t>9/4/19</a:t>
+              <a:t>2/1/2023</a:t>
             </a:fld>
             <a:endParaRPr lang="en-US"/>
           </a:p>
@@ -2360,8 +2360,8 @@
         </p:nvSpPr>
         <p:spPr>
           <a:xfrm>
-            <a:off x="1792288" y="4800600"/>
-            <a:ext cx="5486400" cy="566738"/>
+            <a:off x="1792288" y="2520315"/>
+            <a:ext cx="5486400" cy="297537"/>
           </a:xfrm>
         </p:spPr>
         <p:txBody>
@@ -2392,8 +2392,8 @@
         </p:nvSpPr>
         <p:spPr>
           <a:xfrm>
-            <a:off x="1792288" y="612775"/>
-            <a:ext cx="5486400" cy="4114800"/>
+            <a:off x="1792288" y="321707"/>
+            <a:ext cx="5486400" cy="2160270"/>
           </a:xfrm>
         </p:spPr>
         <p:txBody>
@@ -2403,35 +2403,35 @@
               <a:buNone/>
               <a:defRPr sz="3200"/>
             </a:lvl1pPr>
-            <a:lvl2pPr marL="457200" indent="0">
+            <a:lvl2pPr marL="457219" indent="0">
               <a:buNone/>
               <a:defRPr sz="2800"/>
             </a:lvl2pPr>
-            <a:lvl3pPr marL="914400" indent="0">
+            <a:lvl3pPr marL="914437" indent="0">
               <a:buNone/>
               <a:defRPr sz="2400"/>
             </a:lvl3pPr>
-            <a:lvl4pPr marL="1371600" indent="0">
+            <a:lvl4pPr marL="1371656" indent="0">
               <a:buNone/>
               <a:defRPr sz="2000"/>
             </a:lvl4pPr>
-            <a:lvl5pPr marL="1828800" indent="0">
+            <a:lvl5pPr marL="1828875" indent="0">
               <a:buNone/>
               <a:defRPr sz="2000"/>
             </a:lvl5pPr>
-            <a:lvl6pPr marL="2286000" indent="0">
+            <a:lvl6pPr marL="2286094" indent="0">
               <a:buNone/>
               <a:defRPr sz="2000"/>
             </a:lvl6pPr>
-            <a:lvl7pPr marL="2743200" indent="0">
+            <a:lvl7pPr marL="2743312" indent="0">
               <a:buNone/>
               <a:defRPr sz="2000"/>
             </a:lvl7pPr>
-            <a:lvl8pPr marL="3200400" indent="0">
+            <a:lvl8pPr marL="3200531" indent="0">
               <a:buNone/>
               <a:defRPr sz="2000"/>
             </a:lvl8pPr>
-            <a:lvl9pPr marL="3657600" indent="0">
+            <a:lvl9pPr marL="3657750" indent="0">
               <a:buNone/>
               <a:defRPr sz="2000"/>
             </a:lvl9pPr>
@@ -2453,8 +2453,8 @@
         </p:nvSpPr>
         <p:spPr>
           <a:xfrm>
-            <a:off x="1792288" y="5367338"/>
-            <a:ext cx="5486400" cy="804862"/>
+            <a:off x="1792288" y="2817853"/>
+            <a:ext cx="5486400" cy="422552"/>
           </a:xfrm>
         </p:spPr>
         <p:txBody>
@@ -2464,37 +2464,37 @@
               <a:buNone/>
               <a:defRPr sz="1400"/>
             </a:lvl1pPr>
-            <a:lvl2pPr marL="457200" indent="0">
+            <a:lvl2pPr marL="457219" indent="0">
               <a:buNone/>
               <a:defRPr sz="1200"/>
             </a:lvl2pPr>
-            <a:lvl3pPr marL="914400" indent="0">
+            <a:lvl3pPr marL="914437" indent="0">
               <a:buNone/>
               <a:defRPr sz="1000"/>
             </a:lvl3pPr>
-            <a:lvl4pPr marL="1371600" indent="0">
-              <a:buNone/>
-              <a:defRPr sz="900"/>
+            <a:lvl4pPr marL="1371656" indent="0">
+              <a:buNone/>
+              <a:defRPr sz="901"/>
             </a:lvl4pPr>
-            <a:lvl5pPr marL="1828800" indent="0">
-              <a:buNone/>
-              <a:defRPr sz="900"/>
+            <a:lvl5pPr marL="1828875" indent="0">
+              <a:buNone/>
+              <a:defRPr sz="901"/>
             </a:lvl5pPr>
-            <a:lvl6pPr marL="2286000" indent="0">
-              <a:buNone/>
-              <a:defRPr sz="900"/>
+            <a:lvl6pPr marL="2286094" indent="0">
+              <a:buNone/>
+              <a:defRPr sz="901"/>
             </a:lvl6pPr>
-            <a:lvl7pPr marL="2743200" indent="0">
-              <a:buNone/>
-              <a:defRPr sz="900"/>
+            <a:lvl7pPr marL="2743312" indent="0">
+              <a:buNone/>
+              <a:defRPr sz="901"/>
             </a:lvl7pPr>
-            <a:lvl8pPr marL="3200400" indent="0">
-              <a:buNone/>
-              <a:defRPr sz="900"/>
+            <a:lvl8pPr marL="3200531" indent="0">
+              <a:buNone/>
+              <a:defRPr sz="901"/>
             </a:lvl8pPr>
-            <a:lvl9pPr marL="3657600" indent="0">
-              <a:buNone/>
-              <a:defRPr sz="900"/>
+            <a:lvl9pPr marL="3657750" indent="0">
+              <a:buNone/>
+              <a:defRPr sz="901"/>
             </a:lvl9pPr>
           </a:lstStyle>
           <a:p>
@@ -2523,7 +2523,7 @@
           <a:p>
             <a:fld id="{779256A2-DE0C-7447-B687-786F38514E8C}" type="datetimeFigureOut">
               <a:rPr lang="en-US" smtClean="0"/>
-              <a:t>9/4/19</a:t>
+              <a:t>2/1/2023</a:t>
             </a:fld>
             <a:endParaRPr lang="en-US"/>
           </a:p>
@@ -2618,8 +2618,8 @@
         </p:nvSpPr>
         <p:spPr>
           <a:xfrm>
-            <a:off x="457200" y="274638"/>
-            <a:ext cx="8229600" cy="1143000"/>
+            <a:off x="457200" y="144185"/>
+            <a:ext cx="8229600" cy="600075"/>
           </a:xfrm>
           <a:prstGeom prst="rect">
             <a:avLst/>
@@ -2651,8 +2651,8 @@
         </p:nvSpPr>
         <p:spPr>
           <a:xfrm>
-            <a:off x="457200" y="1600200"/>
-            <a:ext cx="8229600" cy="4525963"/>
+            <a:off x="457200" y="840106"/>
+            <a:ext cx="8229600" cy="2376131"/>
           </a:xfrm>
           <a:prstGeom prst="rect">
             <a:avLst/>
@@ -2713,8 +2713,8 @@
         </p:nvSpPr>
         <p:spPr>
           <a:xfrm>
-            <a:off x="457200" y="6356350"/>
-            <a:ext cx="2133600" cy="365125"/>
+            <a:off x="457200" y="3337085"/>
+            <a:ext cx="2133600" cy="191691"/>
           </a:xfrm>
           <a:prstGeom prst="rect">
             <a:avLst/>
@@ -2736,7 +2736,7 @@
           <a:p>
             <a:fld id="{779256A2-DE0C-7447-B687-786F38514E8C}" type="datetimeFigureOut">
               <a:rPr lang="en-US" smtClean="0"/>
-              <a:t>9/4/19</a:t>
+              <a:t>2/1/2023</a:t>
             </a:fld>
             <a:endParaRPr lang="en-US"/>
           </a:p>
@@ -2754,8 +2754,8 @@
         </p:nvSpPr>
         <p:spPr>
           <a:xfrm>
-            <a:off x="3124200" y="6356350"/>
-            <a:ext cx="2895600" cy="365125"/>
+            <a:off x="3124200" y="3337085"/>
+            <a:ext cx="2895600" cy="191691"/>
           </a:xfrm>
           <a:prstGeom prst="rect">
             <a:avLst/>
@@ -2791,8 +2791,8 @@
         </p:nvSpPr>
         <p:spPr>
           <a:xfrm>
-            <a:off x="6553200" y="6356350"/>
-            <a:ext cx="2133600" cy="365125"/>
+            <a:off x="6553200" y="3337085"/>
+            <a:ext cx="2133600" cy="191691"/>
           </a:xfrm>
           <a:prstGeom prst="rect">
             <a:avLst/>
@@ -2843,7 +2843,7 @@
   </p:sldLayoutIdLst>
   <p:txStyles>
     <p:titleStyle>
-      <a:lvl1pPr algn="ctr" defTabSz="457200" rtl="0" eaLnBrk="1" latinLnBrk="0" hangingPunct="1">
+      <a:lvl1pPr algn="ctr" defTabSz="457219" rtl="0" eaLnBrk="1" latinLnBrk="0" hangingPunct="1">
         <a:spcBef>
           <a:spcPct val="0"/>
         </a:spcBef>
@@ -2859,7 +2859,7 @@
       </a:lvl1pPr>
     </p:titleStyle>
     <p:bodyStyle>
-      <a:lvl1pPr marL="342900" indent="-342900" algn="l" defTabSz="457200" rtl="0" eaLnBrk="1" latinLnBrk="0" hangingPunct="1">
+      <a:lvl1pPr marL="342915" indent="-342915" algn="l" defTabSz="457219" rtl="0" eaLnBrk="1" latinLnBrk="0" hangingPunct="1">
         <a:spcBef>
           <a:spcPct val="20000"/>
         </a:spcBef>
@@ -2874,7 +2874,7 @@
           <a:cs typeface="+mn-cs"/>
         </a:defRPr>
       </a:lvl1pPr>
-      <a:lvl2pPr marL="742950" indent="-285750" algn="l" defTabSz="457200" rtl="0" eaLnBrk="1" latinLnBrk="0" hangingPunct="1">
+      <a:lvl2pPr marL="742980" indent="-285761" algn="l" defTabSz="457219" rtl="0" eaLnBrk="1" latinLnBrk="0" hangingPunct="1">
         <a:spcBef>
           <a:spcPct val="20000"/>
         </a:spcBef>
@@ -2889,7 +2889,7 @@
           <a:cs typeface="+mn-cs"/>
         </a:defRPr>
       </a:lvl2pPr>
-      <a:lvl3pPr marL="1143000" indent="-228600" algn="l" defTabSz="457200" rtl="0" eaLnBrk="1" latinLnBrk="0" hangingPunct="1">
+      <a:lvl3pPr marL="1143047" indent="-228609" algn="l" defTabSz="457219" rtl="0" eaLnBrk="1" latinLnBrk="0" hangingPunct="1">
         <a:spcBef>
           <a:spcPct val="20000"/>
         </a:spcBef>
@@ -2904,7 +2904,7 @@
           <a:cs typeface="+mn-cs"/>
         </a:defRPr>
       </a:lvl3pPr>
-      <a:lvl4pPr marL="1600200" indent="-228600" algn="l" defTabSz="457200" rtl="0" eaLnBrk="1" latinLnBrk="0" hangingPunct="1">
+      <a:lvl4pPr marL="1600266" indent="-228609" algn="l" defTabSz="457219" rtl="0" eaLnBrk="1" latinLnBrk="0" hangingPunct="1">
         <a:spcBef>
           <a:spcPct val="20000"/>
         </a:spcBef>
@@ -2919,7 +2919,7 @@
           <a:cs typeface="+mn-cs"/>
         </a:defRPr>
       </a:lvl4pPr>
-      <a:lvl5pPr marL="2057400" indent="-228600" algn="l" defTabSz="457200" rtl="0" eaLnBrk="1" latinLnBrk="0" hangingPunct="1">
+      <a:lvl5pPr marL="2057484" indent="-228609" algn="l" defTabSz="457219" rtl="0" eaLnBrk="1" latinLnBrk="0" hangingPunct="1">
         <a:spcBef>
           <a:spcPct val="20000"/>
         </a:spcBef>
@@ -2934,7 +2934,7 @@
           <a:cs typeface="+mn-cs"/>
         </a:defRPr>
       </a:lvl5pPr>
-      <a:lvl6pPr marL="2514600" indent="-228600" algn="l" defTabSz="457200" rtl="0" eaLnBrk="1" latinLnBrk="0" hangingPunct="1">
+      <a:lvl6pPr marL="2514703" indent="-228609" algn="l" defTabSz="457219" rtl="0" eaLnBrk="1" latinLnBrk="0" hangingPunct="1">
         <a:spcBef>
           <a:spcPct val="20000"/>
         </a:spcBef>
@@ -2949,7 +2949,7 @@
           <a:cs typeface="+mn-cs"/>
         </a:defRPr>
       </a:lvl6pPr>
-      <a:lvl7pPr marL="2971800" indent="-228600" algn="l" defTabSz="457200" rtl="0" eaLnBrk="1" latinLnBrk="0" hangingPunct="1">
+      <a:lvl7pPr marL="2971922" indent="-228609" algn="l" defTabSz="457219" rtl="0" eaLnBrk="1" latinLnBrk="0" hangingPunct="1">
         <a:spcBef>
           <a:spcPct val="20000"/>
         </a:spcBef>
@@ -2964,7 +2964,7 @@
           <a:cs typeface="+mn-cs"/>
         </a:defRPr>
       </a:lvl7pPr>
-      <a:lvl8pPr marL="3429000" indent="-228600" algn="l" defTabSz="457200" rtl="0" eaLnBrk="1" latinLnBrk="0" hangingPunct="1">
+      <a:lvl8pPr marL="3429141" indent="-228609" algn="l" defTabSz="457219" rtl="0" eaLnBrk="1" latinLnBrk="0" hangingPunct="1">
         <a:spcBef>
           <a:spcPct val="20000"/>
         </a:spcBef>
@@ -2979,7 +2979,7 @@
           <a:cs typeface="+mn-cs"/>
         </a:defRPr>
       </a:lvl8pPr>
-      <a:lvl9pPr marL="3886200" indent="-228600" algn="l" defTabSz="457200" rtl="0" eaLnBrk="1" latinLnBrk="0" hangingPunct="1">
+      <a:lvl9pPr marL="3886359" indent="-228609" algn="l" defTabSz="457219" rtl="0" eaLnBrk="1" latinLnBrk="0" hangingPunct="1">
         <a:spcBef>
           <a:spcPct val="20000"/>
         </a:spcBef>
@@ -2999,7 +2999,7 @@
       <a:defPPr>
         <a:defRPr lang="en-US"/>
       </a:defPPr>
-      <a:lvl1pPr marL="0" algn="l" defTabSz="457200" rtl="0" eaLnBrk="1" latinLnBrk="0" hangingPunct="1">
+      <a:lvl1pPr marL="0" algn="l" defTabSz="457219" rtl="0" eaLnBrk="1" latinLnBrk="0" hangingPunct="1">
         <a:defRPr sz="1800" kern="1200">
           <a:solidFill>
             <a:schemeClr val="tx1"/>
@@ -3009,7 +3009,7 @@
           <a:cs typeface="+mn-cs"/>
         </a:defRPr>
       </a:lvl1pPr>
-      <a:lvl2pPr marL="457200" algn="l" defTabSz="457200" rtl="0" eaLnBrk="1" latinLnBrk="0" hangingPunct="1">
+      <a:lvl2pPr marL="457219" algn="l" defTabSz="457219" rtl="0" eaLnBrk="1" latinLnBrk="0" hangingPunct="1">
         <a:defRPr sz="1800" kern="1200">
           <a:solidFill>
             <a:schemeClr val="tx1"/>
@@ -3019,7 +3019,7 @@
           <a:cs typeface="+mn-cs"/>
         </a:defRPr>
       </a:lvl2pPr>
-      <a:lvl3pPr marL="914400" algn="l" defTabSz="457200" rtl="0" eaLnBrk="1" latinLnBrk="0" hangingPunct="1">
+      <a:lvl3pPr marL="914437" algn="l" defTabSz="457219" rtl="0" eaLnBrk="1" latinLnBrk="0" hangingPunct="1">
         <a:defRPr sz="1800" kern="1200">
           <a:solidFill>
             <a:schemeClr val="tx1"/>
@@ -3029,7 +3029,7 @@
           <a:cs typeface="+mn-cs"/>
         </a:defRPr>
       </a:lvl3pPr>
-      <a:lvl4pPr marL="1371600" algn="l" defTabSz="457200" rtl="0" eaLnBrk="1" latinLnBrk="0" hangingPunct="1">
+      <a:lvl4pPr marL="1371656" algn="l" defTabSz="457219" rtl="0" eaLnBrk="1" latinLnBrk="0" hangingPunct="1">
         <a:defRPr sz="1800" kern="1200">
           <a:solidFill>
             <a:schemeClr val="tx1"/>
@@ -3039,7 +3039,7 @@
           <a:cs typeface="+mn-cs"/>
         </a:defRPr>
       </a:lvl4pPr>
-      <a:lvl5pPr marL="1828800" algn="l" defTabSz="457200" rtl="0" eaLnBrk="1" latinLnBrk="0" hangingPunct="1">
+      <a:lvl5pPr marL="1828875" algn="l" defTabSz="457219" rtl="0" eaLnBrk="1" latinLnBrk="0" hangingPunct="1">
         <a:defRPr sz="1800" kern="1200">
           <a:solidFill>
             <a:schemeClr val="tx1"/>
@@ -3049,7 +3049,7 @@
           <a:cs typeface="+mn-cs"/>
         </a:defRPr>
       </a:lvl5pPr>
-      <a:lvl6pPr marL="2286000" algn="l" defTabSz="457200" rtl="0" eaLnBrk="1" latinLnBrk="0" hangingPunct="1">
+      <a:lvl6pPr marL="2286094" algn="l" defTabSz="457219" rtl="0" eaLnBrk="1" latinLnBrk="0" hangingPunct="1">
         <a:defRPr sz="1800" kern="1200">
           <a:solidFill>
             <a:schemeClr val="tx1"/>
@@ -3059,7 +3059,7 @@
           <a:cs typeface="+mn-cs"/>
         </a:defRPr>
       </a:lvl6pPr>
-      <a:lvl7pPr marL="2743200" algn="l" defTabSz="457200" rtl="0" eaLnBrk="1" latinLnBrk="0" hangingPunct="1">
+      <a:lvl7pPr marL="2743312" algn="l" defTabSz="457219" rtl="0" eaLnBrk="1" latinLnBrk="0" hangingPunct="1">
         <a:defRPr sz="1800" kern="1200">
           <a:solidFill>
             <a:schemeClr val="tx1"/>
@@ -3069,7 +3069,7 @@
           <a:cs typeface="+mn-cs"/>
         </a:defRPr>
       </a:lvl7pPr>
-      <a:lvl8pPr marL="3200400" algn="l" defTabSz="457200" rtl="0" eaLnBrk="1" latinLnBrk="0" hangingPunct="1">
+      <a:lvl8pPr marL="3200531" algn="l" defTabSz="457219" rtl="0" eaLnBrk="1" latinLnBrk="0" hangingPunct="1">
         <a:defRPr sz="1800" kern="1200">
           <a:solidFill>
             <a:schemeClr val="tx1"/>
@@ -3079,7 +3079,7 @@
           <a:cs typeface="+mn-cs"/>
         </a:defRPr>
       </a:lvl8pPr>
-      <a:lvl9pPr marL="3657600" algn="l" defTabSz="457200" rtl="0" eaLnBrk="1" latinLnBrk="0" hangingPunct="1">
+      <a:lvl9pPr marL="3657750" algn="l" defTabSz="457219" rtl="0" eaLnBrk="1" latinLnBrk="0" hangingPunct="1">
         <a:defRPr sz="1800" kern="1200">
           <a:solidFill>
             <a:schemeClr val="tx1"/>
@@ -3119,10 +3119,10 @@
         </p:nvGrpSpPr>
         <p:grpSpPr>
           <a:xfrm>
-            <a:off x="189913" y="2868373"/>
-            <a:ext cx="8858711" cy="1252941"/>
-            <a:chOff x="189913" y="3381165"/>
-            <a:chExt cx="8858711" cy="1252941"/>
+            <a:off x="189918" y="1174564"/>
+            <a:ext cx="8858711" cy="1317976"/>
+            <a:chOff x="189913" y="3316131"/>
+            <a:chExt cx="8858711" cy="1317975"/>
           </a:xfrm>
         </p:grpSpPr>
         <p:grpSp>
@@ -3206,8 +3206,8 @@
               </p:nvSpPr>
               <p:spPr>
                 <a:xfrm>
-                  <a:off x="1673605" y="2052185"/>
-                  <a:ext cx="762949" cy="461665"/>
+                  <a:off x="1673606" y="2107121"/>
+                  <a:ext cx="766557" cy="461665"/>
                 </a:xfrm>
                 <a:prstGeom prst="rect">
                   <a:avLst/>
@@ -3298,8 +3298,8 @@
               </p:nvSpPr>
               <p:spPr>
                 <a:xfrm>
-                  <a:off x="1673605" y="2052185"/>
-                  <a:ext cx="762949" cy="461665"/>
+                  <a:off x="1673606" y="2107121"/>
+                  <a:ext cx="766557" cy="461665"/>
                 </a:xfrm>
                 <a:prstGeom prst="rect">
                   <a:avLst/>
@@ -3333,9 +3333,9 @@
           <p:grpSpPr>
             <a:xfrm>
               <a:off x="3885481" y="3381165"/>
-              <a:ext cx="1523744" cy="1246370"/>
+              <a:ext cx="1483694" cy="1246370"/>
               <a:chOff x="3703297" y="1721177"/>
-              <a:chExt cx="1523744" cy="1246370"/>
+              <a:chExt cx="1483694" cy="1246370"/>
             </a:xfrm>
           </p:grpSpPr>
           <p:sp>
@@ -3394,8 +3394,8 @@
             </p:nvSpPr>
             <p:spPr>
               <a:xfrm>
-                <a:off x="3726309" y="2113529"/>
-                <a:ext cx="1500732" cy="461665"/>
+                <a:off x="3740419" y="2113529"/>
+                <a:ext cx="1393330" cy="400110"/>
               </a:xfrm>
               <a:prstGeom prst="rect">
                 <a:avLst/>
@@ -3408,14 +3408,15 @@
               </a:bodyPr>
               <a:lstStyle/>
               <a:p>
+                <a:pPr algn="ctr"/>
                 <a:r>
-                  <a:rPr lang="en-US" sz="2400" dirty="0" err="1">
+                  <a:rPr lang="en-US" sz="2000" dirty="0" err="1">
                     <a:latin typeface="Times New Roman"/>
                     <a:cs typeface="Times New Roman"/>
                   </a:rPr>
-                  <a:t>ProgName</a:t>
+                  <a:t>ImgBeamer</a:t>
                 </a:r>
-                <a:endParaRPr lang="en-US" sz="2400" dirty="0">
+                <a:endParaRPr lang="en-US" sz="2000" dirty="0">
                   <a:latin typeface="Times New Roman"/>
                   <a:cs typeface="Times New Roman"/>
                 </a:endParaRPr>
@@ -3427,6 +3428,7 @@
           <p:nvCxnSpPr>
             <p:cNvPr id="25" name="Straight Arrow Connector 24"/>
             <p:cNvCxnSpPr>
+              <a:cxnSpLocks/>
               <a:stCxn id="4" idx="6"/>
               <a:endCxn id="18" idx="1"/>
             </p:cNvCxnSpPr>
@@ -3508,8 +3510,8 @@
           </p:nvSpPr>
           <p:spPr>
             <a:xfrm>
-              <a:off x="1745191" y="3577615"/>
-              <a:ext cx="1114408" cy="369332"/>
+              <a:off x="1740121" y="3316131"/>
+              <a:ext cx="1678665" cy="646331"/>
             </a:xfrm>
             <a:prstGeom prst="rect">
               <a:avLst/>
@@ -3527,7 +3529,20 @@
                   <a:latin typeface="Times New Roman"/>
                   <a:cs typeface="Times New Roman"/>
                 </a:rPr>
-                <a:t>Inputs: …</a:t>
+                <a:t>Image</a:t>
+              </a:r>
+              <a:br>
+                <a:rPr lang="en-US" dirty="0">
+                  <a:latin typeface="Times New Roman"/>
+                  <a:cs typeface="Times New Roman"/>
+                </a:rPr>
+              </a:br>
+              <a:r>
+                <a:rPr lang="en-US" dirty="0">
+                  <a:latin typeface="Times New Roman"/>
+                  <a:cs typeface="Times New Roman"/>
+                </a:rPr>
+                <a:t>User Interaction</a:t>
               </a:r>
             </a:p>
           </p:txBody>
@@ -3540,8 +3555,8 @@
           </p:nvSpPr>
           <p:spPr>
             <a:xfrm>
-              <a:off x="5369175" y="3577615"/>
-              <a:ext cx="1268296" cy="369332"/>
+              <a:off x="5868052" y="3572278"/>
+              <a:ext cx="1401922" cy="369332"/>
             </a:xfrm>
             <a:prstGeom prst="rect">
               <a:avLst/>
@@ -3559,7 +3574,7 @@
                   <a:latin typeface="Times New Roman"/>
                   <a:cs typeface="Times New Roman"/>
                 </a:rPr>
-                <a:t>Outputs: …</a:t>
+                <a:t>Visualization</a:t>
               </a:r>
             </a:p>
           </p:txBody>

</xml_diff>

<commit_message>
update sys context fig
</commit_message>
<xml_diff>
--- a/docs/SRS/SystemContextFigure.pptx
+++ b/docs/SRS/SystemContextFigure.pptx
@@ -7,7 +7,7 @@
   <p:sldIdLst>
     <p:sldId id="256" r:id="rId2"/>
   </p:sldIdLst>
-  <p:sldSz cx="9144000" cy="3600450"/>
+  <p:sldSz cx="9144000" cy="2879725"/>
   <p:notesSz cx="6858000" cy="9144000"/>
   <p:defaultTextStyle>
     <a:defPPr>
@@ -107,7 +107,7 @@
   <p:extLst>
     <p:ext uri="{EFAFB233-063F-42B5-8137-9DF3F51BA10A}">
       <p15:sldGuideLst xmlns:p15="http://schemas.microsoft.com/office/powerpoint/2012/main">
-        <p15:guide id="1" orient="horz" pos="1134" userDrawn="1">
+        <p15:guide id="1" orient="horz" pos="907" userDrawn="1">
           <p15:clr>
             <a:srgbClr val="A4A3A4"/>
           </p15:clr>
@@ -152,8 +152,8 @@
         </p:nvSpPr>
         <p:spPr>
           <a:xfrm>
-            <a:off x="685800" y="1118473"/>
-            <a:ext cx="7772400" cy="771763"/>
+            <a:off x="685800" y="894582"/>
+            <a:ext cx="7772400" cy="617274"/>
           </a:xfrm>
         </p:spPr>
         <p:txBody>
@@ -180,8 +180,8 @@
         </p:nvSpPr>
         <p:spPr>
           <a:xfrm>
-            <a:off x="1371600" y="2040255"/>
-            <a:ext cx="6400800" cy="920115"/>
+            <a:off x="1371600" y="1631844"/>
+            <a:ext cx="6400800" cy="735930"/>
           </a:xfrm>
         </p:spPr>
         <p:txBody>
@@ -564,8 +564,8 @@
         </p:nvSpPr>
         <p:spPr>
           <a:xfrm>
-            <a:off x="6629400" y="144186"/>
-            <a:ext cx="2057400" cy="3072050"/>
+            <a:off x="6629400" y="115323"/>
+            <a:ext cx="2057400" cy="2457098"/>
           </a:xfrm>
         </p:spPr>
         <p:txBody>
@@ -592,8 +592,8 @@
         </p:nvSpPr>
         <p:spPr>
           <a:xfrm>
-            <a:off x="457200" y="144186"/>
-            <a:ext cx="6019800" cy="3072050"/>
+            <a:off x="457200" y="115323"/>
+            <a:ext cx="6019800" cy="2457098"/>
           </a:xfrm>
         </p:spPr>
         <p:txBody>
@@ -914,8 +914,8 @@
         </p:nvSpPr>
         <p:spPr>
           <a:xfrm>
-            <a:off x="722313" y="2313622"/>
-            <a:ext cx="7772400" cy="715089"/>
+            <a:off x="722313" y="1850490"/>
+            <a:ext cx="7772400" cy="571945"/>
           </a:xfrm>
         </p:spPr>
         <p:txBody>
@@ -946,8 +946,8 @@
         </p:nvSpPr>
         <p:spPr>
           <a:xfrm>
-            <a:off x="722313" y="1526025"/>
-            <a:ext cx="7772400" cy="787598"/>
+            <a:off x="722313" y="1220551"/>
+            <a:ext cx="7772400" cy="629939"/>
           </a:xfrm>
         </p:spPr>
         <p:txBody>
@@ -1183,8 +1183,8 @@
         </p:nvSpPr>
         <p:spPr>
           <a:xfrm>
-            <a:off x="457200" y="840106"/>
-            <a:ext cx="4038600" cy="2376131"/>
+            <a:off x="457200" y="671937"/>
+            <a:ext cx="4038600" cy="1900486"/>
           </a:xfrm>
         </p:spPr>
         <p:txBody>
@@ -1268,8 +1268,8 @@
         </p:nvSpPr>
         <p:spPr>
           <a:xfrm>
-            <a:off x="4648200" y="840106"/>
-            <a:ext cx="4038600" cy="2376131"/>
+            <a:off x="4648200" y="671937"/>
+            <a:ext cx="4038600" cy="1900486"/>
           </a:xfrm>
         </p:spPr>
         <p:txBody>
@@ -1475,8 +1475,8 @@
         </p:nvSpPr>
         <p:spPr>
           <a:xfrm>
-            <a:off x="457200" y="805935"/>
-            <a:ext cx="4040188" cy="335875"/>
+            <a:off x="457200" y="644606"/>
+            <a:ext cx="4040188" cy="268641"/>
           </a:xfrm>
         </p:spPr>
         <p:txBody>
@@ -1540,8 +1540,8 @@
         </p:nvSpPr>
         <p:spPr>
           <a:xfrm>
-            <a:off x="457200" y="1141810"/>
-            <a:ext cx="4040188" cy="2074426"/>
+            <a:off x="457200" y="913247"/>
+            <a:ext cx="4040188" cy="1659175"/>
           </a:xfrm>
         </p:spPr>
         <p:txBody>
@@ -1625,8 +1625,8 @@
         </p:nvSpPr>
         <p:spPr>
           <a:xfrm>
-            <a:off x="4645030" y="805935"/>
-            <a:ext cx="4041775" cy="335875"/>
+            <a:off x="4645031" y="644606"/>
+            <a:ext cx="4041775" cy="268641"/>
           </a:xfrm>
         </p:spPr>
         <p:txBody>
@@ -1690,8 +1690,8 @@
         </p:nvSpPr>
         <p:spPr>
           <a:xfrm>
-            <a:off x="4645030" y="1141810"/>
-            <a:ext cx="4041775" cy="2074426"/>
+            <a:off x="4645031" y="913247"/>
+            <a:ext cx="4041775" cy="1659175"/>
           </a:xfrm>
         </p:spPr>
         <p:txBody>
@@ -2083,8 +2083,8 @@
         </p:nvSpPr>
         <p:spPr>
           <a:xfrm>
-            <a:off x="457205" y="143352"/>
-            <a:ext cx="3008313" cy="610076"/>
+            <a:off x="457206" y="114656"/>
+            <a:ext cx="3008313" cy="487953"/>
           </a:xfrm>
         </p:spPr>
         <p:txBody>
@@ -2115,8 +2115,8 @@
         </p:nvSpPr>
         <p:spPr>
           <a:xfrm>
-            <a:off x="3575050" y="143352"/>
-            <a:ext cx="5111750" cy="3072885"/>
+            <a:off x="3575050" y="114657"/>
+            <a:ext cx="5111750" cy="2457766"/>
           </a:xfrm>
         </p:spPr>
         <p:txBody>
@@ -2200,8 +2200,8 @@
         </p:nvSpPr>
         <p:spPr>
           <a:xfrm>
-            <a:off x="457205" y="753428"/>
-            <a:ext cx="3008313" cy="2462808"/>
+            <a:off x="457206" y="602610"/>
+            <a:ext cx="3008313" cy="1969812"/>
           </a:xfrm>
         </p:spPr>
         <p:txBody>
@@ -2360,8 +2360,8 @@
         </p:nvSpPr>
         <p:spPr>
           <a:xfrm>
-            <a:off x="1792288" y="2520315"/>
-            <a:ext cx="5486400" cy="297537"/>
+            <a:off x="1792288" y="2015808"/>
+            <a:ext cx="5486400" cy="237977"/>
           </a:xfrm>
         </p:spPr>
         <p:txBody>
@@ -2392,8 +2392,8 @@
         </p:nvSpPr>
         <p:spPr>
           <a:xfrm>
-            <a:off x="1792288" y="321707"/>
-            <a:ext cx="5486400" cy="2160270"/>
+            <a:off x="1792288" y="257309"/>
+            <a:ext cx="5486400" cy="1727835"/>
           </a:xfrm>
         </p:spPr>
         <p:txBody>
@@ -2453,8 +2453,8 @@
         </p:nvSpPr>
         <p:spPr>
           <a:xfrm>
-            <a:off x="1792288" y="2817853"/>
-            <a:ext cx="5486400" cy="422552"/>
+            <a:off x="1792288" y="2253785"/>
+            <a:ext cx="5486400" cy="337967"/>
           </a:xfrm>
         </p:spPr>
         <p:txBody>
@@ -2618,8 +2618,8 @@
         </p:nvSpPr>
         <p:spPr>
           <a:xfrm>
-            <a:off x="457200" y="144185"/>
-            <a:ext cx="8229600" cy="600075"/>
+            <a:off x="457200" y="115323"/>
+            <a:ext cx="8229600" cy="479954"/>
           </a:xfrm>
           <a:prstGeom prst="rect">
             <a:avLst/>
@@ -2651,8 +2651,8 @@
         </p:nvSpPr>
         <p:spPr>
           <a:xfrm>
-            <a:off x="457200" y="840106"/>
-            <a:ext cx="8229600" cy="2376131"/>
+            <a:off x="457200" y="671937"/>
+            <a:ext cx="8229600" cy="1900486"/>
           </a:xfrm>
           <a:prstGeom prst="rect">
             <a:avLst/>
@@ -2713,8 +2713,8 @@
         </p:nvSpPr>
         <p:spPr>
           <a:xfrm>
-            <a:off x="457200" y="3337085"/>
-            <a:ext cx="2133600" cy="191691"/>
+            <a:off x="457200" y="2669080"/>
+            <a:ext cx="2133600" cy="153319"/>
           </a:xfrm>
           <a:prstGeom prst="rect">
             <a:avLst/>
@@ -2754,8 +2754,8 @@
         </p:nvSpPr>
         <p:spPr>
           <a:xfrm>
-            <a:off x="3124200" y="3337085"/>
-            <a:ext cx="2895600" cy="191691"/>
+            <a:off x="3124200" y="2669080"/>
+            <a:ext cx="2895600" cy="153319"/>
           </a:xfrm>
           <a:prstGeom prst="rect">
             <a:avLst/>
@@ -2791,8 +2791,8 @@
         </p:nvSpPr>
         <p:spPr>
           <a:xfrm>
-            <a:off x="6553200" y="3337085"/>
-            <a:ext cx="2133600" cy="191691"/>
+            <a:off x="6553200" y="2669080"/>
+            <a:ext cx="2133600" cy="153319"/>
           </a:xfrm>
           <a:prstGeom prst="rect">
             <a:avLst/>
@@ -3113,16 +3113,22 @@
       </p:grpSpPr>
       <p:grpSp>
         <p:nvGrpSpPr>
-          <p:cNvPr id="90" name="Group 89"/>
+          <p:cNvPr id="42" name="Group 41">
+            <a:extLst>
+              <a:ext uri="{FF2B5EF4-FFF2-40B4-BE49-F238E27FC236}">
+                <a16:creationId xmlns:a16="http://schemas.microsoft.com/office/drawing/2014/main" id="{37FC024C-E238-E446-ACBE-AB1E0858F1EA}"/>
+              </a:ext>
+            </a:extLst>
+          </p:cNvPr>
           <p:cNvGrpSpPr/>
           <p:nvPr/>
         </p:nvGrpSpPr>
         <p:grpSpPr>
           <a:xfrm>
-            <a:off x="189918" y="1174564"/>
-            <a:ext cx="8858711" cy="1317976"/>
-            <a:chOff x="189913" y="3316131"/>
-            <a:chExt cx="8858711" cy="1317975"/>
+            <a:off x="142645" y="387601"/>
+            <a:ext cx="8858711" cy="2104522"/>
+            <a:chOff x="189918" y="388018"/>
+            <a:chExt cx="8858711" cy="2104522"/>
           </a:xfrm>
         </p:grpSpPr>
         <p:grpSp>
@@ -3133,8 +3139,8 @@
           </p:nvGrpSpPr>
           <p:grpSpPr>
             <a:xfrm>
-              <a:off x="189913" y="3387736"/>
-              <a:ext cx="8858711" cy="1246370"/>
+              <a:off x="189918" y="1246169"/>
+              <a:ext cx="8858711" cy="1246371"/>
               <a:chOff x="189913" y="1721177"/>
               <a:chExt cx="8858711" cy="1246370"/>
             </a:xfrm>
@@ -3332,8 +3338,8 @@
           </p:nvGrpSpPr>
           <p:grpSpPr>
             <a:xfrm>
-              <a:off x="3885481" y="3381165"/>
-              <a:ext cx="1483694" cy="1246370"/>
+              <a:off x="3885486" y="1239598"/>
+              <a:ext cx="1483694" cy="1246371"/>
               <a:chOff x="3703297" y="1721177"/>
               <a:chExt cx="1483694" cy="1246370"/>
             </a:xfrm>
@@ -3436,7 +3442,7 @@
           </p:nvCxnSpPr>
           <p:spPr>
             <a:xfrm flipV="1">
-              <a:off x="1436215" y="4004350"/>
+              <a:off x="1436220" y="1862784"/>
               <a:ext cx="2449266" cy="6571"/>
             </a:xfrm>
             <a:prstGeom prst="straightConnector1">
@@ -3473,7 +3479,7 @@
           </p:nvCxnSpPr>
           <p:spPr>
             <a:xfrm>
-              <a:off x="5369175" y="4010921"/>
+              <a:off x="5369180" y="1869355"/>
               <a:ext cx="2449266" cy="0"/>
             </a:xfrm>
             <a:prstGeom prst="straightConnector1">
@@ -3510,7 +3516,7 @@
           </p:nvSpPr>
           <p:spPr>
             <a:xfrm>
-              <a:off x="1740121" y="3316131"/>
+              <a:off x="1740126" y="1199085"/>
               <a:ext cx="1678665" cy="646331"/>
             </a:xfrm>
             <a:prstGeom prst="rect">
@@ -3555,7 +3561,7 @@
           </p:nvSpPr>
           <p:spPr>
             <a:xfrm>
-              <a:off x="5868052" y="3572278"/>
+              <a:off x="5868057" y="1479753"/>
               <a:ext cx="1401922" cy="369332"/>
             </a:xfrm>
             <a:prstGeom prst="rect">
@@ -3575,6 +3581,93 @@
                   <a:cs typeface="Times New Roman"/>
                 </a:rPr>
                 <a:t>Visualization</a:t>
+              </a:r>
+            </a:p>
+          </p:txBody>
+        </p:sp>
+        <p:cxnSp>
+          <p:nvCxnSpPr>
+            <p:cNvPr id="33" name="Connector: Elbow 32">
+              <a:extLst>
+                <a:ext uri="{FF2B5EF4-FFF2-40B4-BE49-F238E27FC236}">
+                  <a16:creationId xmlns:a16="http://schemas.microsoft.com/office/drawing/2014/main" id="{712A9B15-413D-2E78-B9A7-F6415D0E48DC}"/>
+                </a:ext>
+              </a:extLst>
+            </p:cNvPr>
+            <p:cNvCxnSpPr>
+              <a:cxnSpLocks/>
+              <a:stCxn id="8" idx="0"/>
+              <a:endCxn id="18" idx="0"/>
+            </p:cNvCxnSpPr>
+            <p:nvPr/>
+          </p:nvCxnSpPr>
+          <p:spPr>
+            <a:xfrm rot="16200000" flipV="1">
+              <a:off x="6523121" y="-656189"/>
+              <a:ext cx="6571" cy="3798145"/>
+            </a:xfrm>
+            <a:prstGeom prst="bentConnector3">
+              <a:avLst>
+                <a:gd name="adj1" fmla="val 7097839"/>
+              </a:avLst>
+            </a:prstGeom>
+            <a:ln w="38100">
+              <a:solidFill>
+                <a:schemeClr val="tx1"/>
+              </a:solidFill>
+              <a:tailEnd type="arrow"/>
+            </a:ln>
+            <a:effectLst/>
+          </p:spPr>
+          <p:style>
+            <a:lnRef idx="2">
+              <a:schemeClr val="accent1"/>
+            </a:lnRef>
+            <a:fillRef idx="0">
+              <a:schemeClr val="accent1"/>
+            </a:fillRef>
+            <a:effectRef idx="1">
+              <a:schemeClr val="accent1"/>
+            </a:effectRef>
+            <a:fontRef idx="minor">
+              <a:schemeClr val="tx1"/>
+            </a:fontRef>
+          </p:style>
+        </p:cxnSp>
+        <p:sp>
+          <p:nvSpPr>
+            <p:cNvPr id="40" name="TextBox 39">
+              <a:extLst>
+                <a:ext uri="{FF2B5EF4-FFF2-40B4-BE49-F238E27FC236}">
+                  <a16:creationId xmlns:a16="http://schemas.microsoft.com/office/drawing/2014/main" id="{B5D1A119-6BC3-308A-BC8D-0720F20B53F0}"/>
+                </a:ext>
+              </a:extLst>
+            </p:cNvPr>
+            <p:cNvSpPr txBox="1"/>
+            <p:nvPr/>
+          </p:nvSpPr>
+          <p:spPr>
+            <a:xfrm>
+              <a:off x="5780742" y="388018"/>
+              <a:ext cx="1678665" cy="369332"/>
+            </a:xfrm>
+            <a:prstGeom prst="rect">
+              <a:avLst/>
+            </a:prstGeom>
+            <a:noFill/>
+          </p:spPr>
+          <p:txBody>
+            <a:bodyPr wrap="none" rtlCol="0">
+              <a:spAutoFit/>
+            </a:bodyPr>
+            <a:lstStyle/>
+            <a:p>
+              <a:r>
+                <a:rPr lang="en-US" dirty="0">
+                  <a:latin typeface="Times New Roman"/>
+                  <a:cs typeface="Times New Roman"/>
+                </a:rPr>
+                <a:t>User Interaction</a:t>
               </a:r>
             </a:p>
           </p:txBody>

</xml_diff>

<commit_message>
update sys ctx fig
</commit_message>
<xml_diff>
--- a/docs/SRS/SystemContextFigure.pptx
+++ b/docs/SRS/SystemContextFigure.pptx
@@ -3125,10 +3125,10 @@
         </p:nvGrpSpPr>
         <p:grpSpPr>
           <a:xfrm>
-            <a:off x="142645" y="387601"/>
-            <a:ext cx="8858711" cy="2104522"/>
-            <a:chOff x="189918" y="388018"/>
-            <a:chExt cx="8858711" cy="2104522"/>
+            <a:off x="142645" y="393407"/>
+            <a:ext cx="8858711" cy="2098716"/>
+            <a:chOff x="189918" y="393824"/>
+            <a:chExt cx="8858711" cy="2098716"/>
           </a:xfrm>
         </p:grpSpPr>
         <p:grpSp>
@@ -3516,8 +3516,8 @@
           </p:nvSpPr>
           <p:spPr>
             <a:xfrm>
-              <a:off x="1740126" y="1199085"/>
-              <a:ext cx="1678665" cy="646331"/>
+              <a:off x="1588411" y="1203092"/>
+              <a:ext cx="2083134" cy="646331"/>
             </a:xfrm>
             <a:prstGeom prst="rect">
               <a:avLst/>
@@ -3535,7 +3535,7 @@
                   <a:latin typeface="Times New Roman"/>
                   <a:cs typeface="Times New Roman"/>
                 </a:rPr>
-                <a:t>Image</a:t>
+                <a:t>Ground Truth Image</a:t>
               </a:r>
               <a:br>
                 <a:rPr lang="en-US" dirty="0">
@@ -3561,8 +3561,8 @@
           </p:nvSpPr>
           <p:spPr>
             <a:xfrm>
-              <a:off x="5868057" y="1479753"/>
-              <a:ext cx="1401922" cy="369332"/>
+              <a:off x="5492612" y="1204187"/>
+              <a:ext cx="2185214" cy="646331"/>
             </a:xfrm>
             <a:prstGeom prst="rect">
               <a:avLst/>
@@ -3581,6 +3581,15 @@
                   <a:cs typeface="Times New Roman"/>
                 </a:rPr>
                 <a:t>Visualization</a:t>
+              </a:r>
+            </a:p>
+            <a:p>
+              <a:r>
+                <a:rPr lang="en-US" dirty="0">
+                  <a:latin typeface="Times New Roman"/>
+                  <a:cs typeface="Times New Roman"/>
+                </a:rPr>
+                <a:t>Image Quality Metric</a:t>
               </a:r>
             </a:p>
           </p:txBody>
@@ -3648,7 +3657,7 @@
           </p:nvSpPr>
           <p:spPr>
             <a:xfrm>
-              <a:off x="5780742" y="388018"/>
+              <a:off x="5780742" y="393824"/>
               <a:ext cx="1678665" cy="369332"/>
             </a:xfrm>
             <a:prstGeom prst="rect">

</xml_diff>

<commit_message>
update sys ctx fig, some clean up
</commit_message>
<xml_diff>
--- a/docs/SRS/SystemContextFigure.pptx
+++ b/docs/SRS/SystemContextFigure.pptx
@@ -304,7 +304,7 @@
           <a:p>
             <a:fld id="{779256A2-DE0C-7447-B687-786F38514E8C}" type="datetimeFigureOut">
               <a:rPr lang="en-US" smtClean="0"/>
-              <a:t>2/1/2023</a:t>
+              <a:t>2/2/2023</a:t>
             </a:fld>
             <a:endParaRPr lang="en-US"/>
           </a:p>
@@ -474,7 +474,7 @@
           <a:p>
             <a:fld id="{779256A2-DE0C-7447-B687-786F38514E8C}" type="datetimeFigureOut">
               <a:rPr lang="en-US" smtClean="0"/>
-              <a:t>2/1/2023</a:t>
+              <a:t>2/2/2023</a:t>
             </a:fld>
             <a:endParaRPr lang="en-US"/>
           </a:p>
@@ -654,7 +654,7 @@
           <a:p>
             <a:fld id="{779256A2-DE0C-7447-B687-786F38514E8C}" type="datetimeFigureOut">
               <a:rPr lang="en-US" smtClean="0"/>
-              <a:t>2/1/2023</a:t>
+              <a:t>2/2/2023</a:t>
             </a:fld>
             <a:endParaRPr lang="en-US"/>
           </a:p>
@@ -824,7 +824,7 @@
           <a:p>
             <a:fld id="{779256A2-DE0C-7447-B687-786F38514E8C}" type="datetimeFigureOut">
               <a:rPr lang="en-US" smtClean="0"/>
-              <a:t>2/1/2023</a:t>
+              <a:t>2/2/2023</a:t>
             </a:fld>
             <a:endParaRPr lang="en-US"/>
           </a:p>
@@ -1070,7 +1070,7 @@
           <a:p>
             <a:fld id="{779256A2-DE0C-7447-B687-786F38514E8C}" type="datetimeFigureOut">
               <a:rPr lang="en-US" smtClean="0"/>
-              <a:t>2/1/2023</a:t>
+              <a:t>2/2/2023</a:t>
             </a:fld>
             <a:endParaRPr lang="en-US"/>
           </a:p>
@@ -1358,7 +1358,7 @@
           <a:p>
             <a:fld id="{779256A2-DE0C-7447-B687-786F38514E8C}" type="datetimeFigureOut">
               <a:rPr lang="en-US" smtClean="0"/>
-              <a:t>2/1/2023</a:t>
+              <a:t>2/2/2023</a:t>
             </a:fld>
             <a:endParaRPr lang="en-US"/>
           </a:p>
@@ -1780,7 +1780,7 @@
           <a:p>
             <a:fld id="{779256A2-DE0C-7447-B687-786F38514E8C}" type="datetimeFigureOut">
               <a:rPr lang="en-US" smtClean="0"/>
-              <a:t>2/1/2023</a:t>
+              <a:t>2/2/2023</a:t>
             </a:fld>
             <a:endParaRPr lang="en-US"/>
           </a:p>
@@ -1898,7 +1898,7 @@
           <a:p>
             <a:fld id="{779256A2-DE0C-7447-B687-786F38514E8C}" type="datetimeFigureOut">
               <a:rPr lang="en-US" smtClean="0"/>
-              <a:t>2/1/2023</a:t>
+              <a:t>2/2/2023</a:t>
             </a:fld>
             <a:endParaRPr lang="en-US"/>
           </a:p>
@@ -1993,7 +1993,7 @@
           <a:p>
             <a:fld id="{779256A2-DE0C-7447-B687-786F38514E8C}" type="datetimeFigureOut">
               <a:rPr lang="en-US" smtClean="0"/>
-              <a:t>2/1/2023</a:t>
+              <a:t>2/2/2023</a:t>
             </a:fld>
             <a:endParaRPr lang="en-US"/>
           </a:p>
@@ -2270,7 +2270,7 @@
           <a:p>
             <a:fld id="{779256A2-DE0C-7447-B687-786F38514E8C}" type="datetimeFigureOut">
               <a:rPr lang="en-US" smtClean="0"/>
-              <a:t>2/1/2023</a:t>
+              <a:t>2/2/2023</a:t>
             </a:fld>
             <a:endParaRPr lang="en-US"/>
           </a:p>
@@ -2523,7 +2523,7 @@
           <a:p>
             <a:fld id="{779256A2-DE0C-7447-B687-786F38514E8C}" type="datetimeFigureOut">
               <a:rPr lang="en-US" smtClean="0"/>
-              <a:t>2/1/2023</a:t>
+              <a:t>2/2/2023</a:t>
             </a:fld>
             <a:endParaRPr lang="en-US"/>
           </a:p>
@@ -2736,7 +2736,7 @@
           <a:p>
             <a:fld id="{779256A2-DE0C-7447-B687-786F38514E8C}" type="datetimeFigureOut">
               <a:rPr lang="en-US" smtClean="0"/>
-              <a:t>2/1/2023</a:t>
+              <a:t>2/2/2023</a:t>
             </a:fld>
             <a:endParaRPr lang="en-US"/>
           </a:p>
@@ -3125,10 +3125,10 @@
         </p:nvGrpSpPr>
         <p:grpSpPr>
           <a:xfrm>
-            <a:off x="142645" y="393407"/>
-            <a:ext cx="8858711" cy="2098716"/>
-            <a:chOff x="189918" y="393824"/>
-            <a:chExt cx="8858711" cy="2098716"/>
+            <a:off x="142645" y="165105"/>
+            <a:ext cx="8858711" cy="2100592"/>
+            <a:chOff x="189918" y="391948"/>
+            <a:chExt cx="8858711" cy="2100592"/>
           </a:xfrm>
         </p:grpSpPr>
         <p:grpSp>
@@ -3548,7 +3548,7 @@
                   <a:latin typeface="Times New Roman"/>
                   <a:cs typeface="Times New Roman"/>
                 </a:rPr>
-                <a:t>User Interaction</a:t>
+                <a:t>User Interaction¹</a:t>
               </a:r>
             </a:p>
           </p:txBody>
@@ -3561,7 +3561,7 @@
           </p:nvSpPr>
           <p:spPr>
             <a:xfrm>
-              <a:off x="5492612" y="1204187"/>
+              <a:off x="5474981" y="1201418"/>
               <a:ext cx="2185214" cy="646331"/>
             </a:xfrm>
             <a:prstGeom prst="rect">
@@ -3580,7 +3580,7 @@
                   <a:latin typeface="Times New Roman"/>
                   <a:cs typeface="Times New Roman"/>
                 </a:rPr>
-                <a:t>Visualization</a:t>
+                <a:t>Visualization²</a:t>
               </a:r>
             </a:p>
             <a:p>
@@ -3657,8 +3657,8 @@
           </p:nvSpPr>
           <p:spPr>
             <a:xfrm>
-              <a:off x="5780742" y="393824"/>
-              <a:ext cx="1678665" cy="369332"/>
+              <a:off x="5629365" y="391948"/>
+              <a:ext cx="1816523" cy="369332"/>
             </a:xfrm>
             <a:prstGeom prst="rect">
               <a:avLst/>
@@ -3676,12 +3676,50 @@
                   <a:latin typeface="Times New Roman"/>
                   <a:cs typeface="Times New Roman"/>
                 </a:rPr>
-                <a:t>User Interaction</a:t>
+                <a:t>User Interaction¹</a:t>
               </a:r>
             </a:p>
           </p:txBody>
         </p:sp>
       </p:grpSp>
+      <p:sp>
+        <p:nvSpPr>
+          <p:cNvPr id="3" name="TextBox 2">
+            <a:extLst>
+              <a:ext uri="{FF2B5EF4-FFF2-40B4-BE49-F238E27FC236}">
+                <a16:creationId xmlns:a16="http://schemas.microsoft.com/office/drawing/2014/main" id="{D4BE1DAE-4031-129F-A62F-71787E6360FC}"/>
+              </a:ext>
+            </a:extLst>
+          </p:cNvPr>
+          <p:cNvSpPr txBox="1"/>
+          <p:nvPr/>
+        </p:nvSpPr>
+        <p:spPr>
+          <a:xfrm>
+            <a:off x="696665" y="2472703"/>
+            <a:ext cx="4572000" cy="338554"/>
+          </a:xfrm>
+          <a:prstGeom prst="rect">
+            <a:avLst/>
+          </a:prstGeom>
+          <a:noFill/>
+        </p:spPr>
+        <p:txBody>
+          <a:bodyPr wrap="square">
+            <a:spAutoFit/>
+          </a:bodyPr>
+          <a:lstStyle/>
+          <a:p>
+            <a:r>
+              <a:rPr lang="en-US" sz="1600" dirty="0">
+                <a:latin typeface="Times New Roman"/>
+                <a:cs typeface="Times New Roman"/>
+              </a:rPr>
+              <a:t>¹ Spot profile, pixel size, subregion; ² resulting image</a:t>
+            </a:r>
+          </a:p>
+        </p:txBody>
+      </p:sp>
     </p:spTree>
     <p:extLst>
       <p:ext uri="{BB962C8B-B14F-4D97-AF65-F5344CB8AC3E}">

</xml_diff>